<commit_message>
Added 1DPCA, K-means clustering
</commit_message>
<xml_diff>
--- a/Figures.pptx
+++ b/Figures.pptx
@@ -6,6 +6,7 @@
   </p:sldMasterIdLst>
   <p:sldIdLst>
     <p:sldId id="257" r:id="rId2"/>
+    <p:sldId id="258" r:id="rId3"/>
   </p:sldIdLst>
   <p:sldSz cx="12192000" cy="6858000"/>
   <p:notesSz cx="6858000" cy="9144000"/>
@@ -104,6 +105,11 @@
       </a:defRPr>
     </a:lvl9pPr>
   </p:defaultTextStyle>
+  <p:extLst>
+    <p:ext uri="{EFAFB233-063F-42B5-8137-9DF3F51BA10A}">
+      <p15:sldGuideLst xmlns:p15="http://schemas.microsoft.com/office/powerpoint/2012/main"/>
+    </p:ext>
+  </p:extLst>
 </p:presentation>
 </file>
 
@@ -254,7 +260,7 @@
           <a:p>
             <a:fld id="{19D178F3-8105-4E3E-BF78-88CCB761E84E}" type="datetimeFigureOut">
               <a:rPr lang="en-US" smtClean="0"/>
-              <a:t>11/30/2018</a:t>
+              <a:t>12/7/2018</a:t>
             </a:fld>
             <a:endParaRPr lang="en-US"/>
           </a:p>
@@ -452,7 +458,7 @@
           <a:p>
             <a:fld id="{19D178F3-8105-4E3E-BF78-88CCB761E84E}" type="datetimeFigureOut">
               <a:rPr lang="en-US" smtClean="0"/>
-              <a:t>11/30/2018</a:t>
+              <a:t>12/7/2018</a:t>
             </a:fld>
             <a:endParaRPr lang="en-US"/>
           </a:p>
@@ -660,7 +666,7 @@
           <a:p>
             <a:fld id="{19D178F3-8105-4E3E-BF78-88CCB761E84E}" type="datetimeFigureOut">
               <a:rPr lang="en-US" smtClean="0"/>
-              <a:t>11/30/2018</a:t>
+              <a:t>12/7/2018</a:t>
             </a:fld>
             <a:endParaRPr lang="en-US"/>
           </a:p>
@@ -858,7 +864,7 @@
           <a:p>
             <a:fld id="{19D178F3-8105-4E3E-BF78-88CCB761E84E}" type="datetimeFigureOut">
               <a:rPr lang="en-US" smtClean="0"/>
-              <a:t>11/30/2018</a:t>
+              <a:t>12/7/2018</a:t>
             </a:fld>
             <a:endParaRPr lang="en-US"/>
           </a:p>
@@ -1133,7 +1139,7 @@
           <a:p>
             <a:fld id="{19D178F3-8105-4E3E-BF78-88CCB761E84E}" type="datetimeFigureOut">
               <a:rPr lang="en-US" smtClean="0"/>
-              <a:t>11/30/2018</a:t>
+              <a:t>12/7/2018</a:t>
             </a:fld>
             <a:endParaRPr lang="en-US"/>
           </a:p>
@@ -1398,7 +1404,7 @@
           <a:p>
             <a:fld id="{19D178F3-8105-4E3E-BF78-88CCB761E84E}" type="datetimeFigureOut">
               <a:rPr lang="en-US" smtClean="0"/>
-              <a:t>11/30/2018</a:t>
+              <a:t>12/7/2018</a:t>
             </a:fld>
             <a:endParaRPr lang="en-US"/>
           </a:p>
@@ -1810,7 +1816,7 @@
           <a:p>
             <a:fld id="{19D178F3-8105-4E3E-BF78-88CCB761E84E}" type="datetimeFigureOut">
               <a:rPr lang="en-US" smtClean="0"/>
-              <a:t>11/30/2018</a:t>
+              <a:t>12/7/2018</a:t>
             </a:fld>
             <a:endParaRPr lang="en-US"/>
           </a:p>
@@ -1951,7 +1957,7 @@
           <a:p>
             <a:fld id="{19D178F3-8105-4E3E-BF78-88CCB761E84E}" type="datetimeFigureOut">
               <a:rPr lang="en-US" smtClean="0"/>
-              <a:t>11/30/2018</a:t>
+              <a:t>12/7/2018</a:t>
             </a:fld>
             <a:endParaRPr lang="en-US"/>
           </a:p>
@@ -2064,7 +2070,7 @@
           <a:p>
             <a:fld id="{19D178F3-8105-4E3E-BF78-88CCB761E84E}" type="datetimeFigureOut">
               <a:rPr lang="en-US" smtClean="0"/>
-              <a:t>11/30/2018</a:t>
+              <a:t>12/7/2018</a:t>
             </a:fld>
             <a:endParaRPr lang="en-US"/>
           </a:p>
@@ -2375,7 +2381,7 @@
           <a:p>
             <a:fld id="{19D178F3-8105-4E3E-BF78-88CCB761E84E}" type="datetimeFigureOut">
               <a:rPr lang="en-US" smtClean="0"/>
-              <a:t>11/30/2018</a:t>
+              <a:t>12/7/2018</a:t>
             </a:fld>
             <a:endParaRPr lang="en-US"/>
           </a:p>
@@ -2663,7 +2669,7 @@
           <a:p>
             <a:fld id="{19D178F3-8105-4E3E-BF78-88CCB761E84E}" type="datetimeFigureOut">
               <a:rPr lang="en-US" smtClean="0"/>
-              <a:t>11/30/2018</a:t>
+              <a:t>12/7/2018</a:t>
             </a:fld>
             <a:endParaRPr lang="en-US"/>
           </a:p>
@@ -2904,7 +2910,7 @@
           <a:p>
             <a:fld id="{19D178F3-8105-4E3E-BF78-88CCB761E84E}" type="datetimeFigureOut">
               <a:rPr lang="en-US" smtClean="0"/>
-              <a:t>11/30/2018</a:t>
+              <a:t>12/7/2018</a:t>
             </a:fld>
             <a:endParaRPr lang="en-US"/>
           </a:p>
@@ -3564,6 +3570,1290 @@
 </p:sld>
 </file>
 
+<file path=ppt/slides/slide2.xml><?xml version="1.0" encoding="utf-8"?>
+<p:sld xmlns:a="http://schemas.openxmlformats.org/drawingml/2006/main" xmlns:r="http://schemas.openxmlformats.org/officeDocument/2006/relationships" xmlns:p="http://schemas.openxmlformats.org/presentationml/2006/main">
+  <p:cSld>
+    <p:spTree>
+      <p:nvGrpSpPr>
+        <p:cNvPr id="1" name=""/>
+        <p:cNvGrpSpPr/>
+        <p:nvPr/>
+      </p:nvGrpSpPr>
+      <p:grpSpPr>
+        <a:xfrm>
+          <a:off x="0" y="0"/>
+          <a:ext cx="0" cy="0"/>
+          <a:chOff x="0" y="0"/>
+          <a:chExt cx="0" cy="0"/>
+        </a:xfrm>
+      </p:grpSpPr>
+      <p:grpSp>
+        <p:nvGrpSpPr>
+          <p:cNvPr id="22" name="Group 21">
+            <a:extLst>
+              <a:ext uri="{FF2B5EF4-FFF2-40B4-BE49-F238E27FC236}">
+                <a16:creationId xmlns:a16="http://schemas.microsoft.com/office/drawing/2014/main" id="{BFBF4A0C-A94A-44BD-8C4F-17C6F6595533}"/>
+              </a:ext>
+            </a:extLst>
+          </p:cNvPr>
+          <p:cNvGrpSpPr/>
+          <p:nvPr/>
+        </p:nvGrpSpPr>
+        <p:grpSpPr>
+          <a:xfrm>
+            <a:off x="-149000" y="43544"/>
+            <a:ext cx="17617769" cy="9481880"/>
+            <a:chOff x="-149000" y="43544"/>
+            <a:chExt cx="17617769" cy="9481880"/>
+          </a:xfrm>
+        </p:grpSpPr>
+        <p:pic>
+          <p:nvPicPr>
+            <p:cNvPr id="1025" name="Picture 1">
+              <a:extLst>
+                <a:ext uri="{FF2B5EF4-FFF2-40B4-BE49-F238E27FC236}">
+                  <a16:creationId xmlns:a16="http://schemas.microsoft.com/office/drawing/2014/main" id="{44EA29E5-DC96-45B7-88C1-3D64957A81C3}"/>
+                </a:ext>
+              </a:extLst>
+            </p:cNvPr>
+            <p:cNvPicPr>
+              <a:picLocks noChangeAspect="1" noChangeArrowheads="1"/>
+            </p:cNvPicPr>
+            <p:nvPr/>
+          </p:nvPicPr>
+          <p:blipFill>
+            <a:blip r:embed="rId2">
+              <a:extLst>
+                <a:ext uri="{28A0092B-C50C-407E-A947-70E740481C1C}">
+                  <a14:useLocalDpi xmlns:a14="http://schemas.microsoft.com/office/drawing/2010/main" val="0"/>
+                </a:ext>
+              </a:extLst>
+            </a:blip>
+            <a:srcRect/>
+            <a:stretch>
+              <a:fillRect/>
+            </a:stretch>
+          </p:blipFill>
+          <p:spPr bwMode="auto">
+            <a:xfrm>
+              <a:off x="212271" y="359229"/>
+              <a:ext cx="2790825" cy="3390900"/>
+            </a:xfrm>
+            <a:prstGeom prst="rect">
+              <a:avLst/>
+            </a:prstGeom>
+            <a:noFill/>
+            <a:extLst>
+              <a:ext uri="{909E8E84-426E-40DD-AFC4-6F175D3DCCD1}">
+                <a14:hiddenFill xmlns:a14="http://schemas.microsoft.com/office/drawing/2010/main">
+                  <a:solidFill>
+                    <a:srgbClr val="FFFFFF"/>
+                  </a:solidFill>
+                </a14:hiddenFill>
+              </a:ext>
+            </a:extLst>
+          </p:spPr>
+        </p:pic>
+        <p:pic>
+          <p:nvPicPr>
+            <p:cNvPr id="1026" name="Picture 2">
+              <a:extLst>
+                <a:ext uri="{FF2B5EF4-FFF2-40B4-BE49-F238E27FC236}">
+                  <a16:creationId xmlns:a16="http://schemas.microsoft.com/office/drawing/2014/main" id="{B4FBE868-7335-469E-9302-7D953CFB8030}"/>
+                </a:ext>
+              </a:extLst>
+            </p:cNvPr>
+            <p:cNvPicPr>
+              <a:picLocks noChangeAspect="1" noChangeArrowheads="1"/>
+            </p:cNvPicPr>
+            <p:nvPr/>
+          </p:nvPicPr>
+          <p:blipFill>
+            <a:blip r:embed="rId3">
+              <a:extLst>
+                <a:ext uri="{28A0092B-C50C-407E-A947-70E740481C1C}">
+                  <a14:useLocalDpi xmlns:a14="http://schemas.microsoft.com/office/drawing/2010/main" val="0"/>
+                </a:ext>
+              </a:extLst>
+            </a:blip>
+            <a:srcRect/>
+            <a:stretch>
+              <a:fillRect/>
+            </a:stretch>
+          </p:blipFill>
+          <p:spPr bwMode="auto">
+            <a:xfrm>
+              <a:off x="2992210" y="359229"/>
+              <a:ext cx="2790825" cy="3390900"/>
+            </a:xfrm>
+            <a:prstGeom prst="rect">
+              <a:avLst/>
+            </a:prstGeom>
+            <a:noFill/>
+            <a:extLst>
+              <a:ext uri="{909E8E84-426E-40DD-AFC4-6F175D3DCCD1}">
+                <a14:hiddenFill xmlns:a14="http://schemas.microsoft.com/office/drawing/2010/main">
+                  <a:solidFill>
+                    <a:srgbClr val="FFFFFF"/>
+                  </a:solidFill>
+                </a14:hiddenFill>
+              </a:ext>
+            </a:extLst>
+          </p:spPr>
+        </p:pic>
+        <p:sp>
+          <p:nvSpPr>
+            <p:cNvPr id="2" name="TextBox 1">
+              <a:extLst>
+                <a:ext uri="{FF2B5EF4-FFF2-40B4-BE49-F238E27FC236}">
+                  <a16:creationId xmlns:a16="http://schemas.microsoft.com/office/drawing/2014/main" id="{8FEB377A-6CCB-4986-A2DE-A74551FCBF55}"/>
+                </a:ext>
+              </a:extLst>
+            </p:cNvPr>
+            <p:cNvSpPr txBox="1"/>
+            <p:nvPr/>
+          </p:nvSpPr>
+          <p:spPr>
+            <a:xfrm>
+              <a:off x="1175658" y="3696482"/>
+              <a:ext cx="1551214" cy="369332"/>
+            </a:xfrm>
+            <a:prstGeom prst="rect">
+              <a:avLst/>
+            </a:prstGeom>
+            <a:noFill/>
+          </p:spPr>
+          <p:txBody>
+            <a:bodyPr wrap="square" rtlCol="0">
+              <a:spAutoFit/>
+            </a:bodyPr>
+            <a:lstStyle/>
+            <a:p>
+              <a:r>
+                <a:rPr lang="en-US" b="1" dirty="0"/>
+                <a:t>Reference</a:t>
+              </a:r>
+            </a:p>
+          </p:txBody>
+        </p:sp>
+        <p:sp>
+          <p:nvSpPr>
+            <p:cNvPr id="5" name="TextBox 4">
+              <a:extLst>
+                <a:ext uri="{FF2B5EF4-FFF2-40B4-BE49-F238E27FC236}">
+                  <a16:creationId xmlns:a16="http://schemas.microsoft.com/office/drawing/2014/main" id="{F92ED409-7D47-4CF1-A94C-55589672CE77}"/>
+                </a:ext>
+              </a:extLst>
+            </p:cNvPr>
+            <p:cNvSpPr txBox="1"/>
+            <p:nvPr/>
+          </p:nvSpPr>
+          <p:spPr>
+            <a:xfrm>
+              <a:off x="4113440" y="3696482"/>
+              <a:ext cx="1551214" cy="369332"/>
+            </a:xfrm>
+            <a:prstGeom prst="rect">
+              <a:avLst/>
+            </a:prstGeom>
+            <a:noFill/>
+          </p:spPr>
+          <p:txBody>
+            <a:bodyPr wrap="square" rtlCol="0">
+              <a:spAutoFit/>
+            </a:bodyPr>
+            <a:lstStyle/>
+            <a:p>
+              <a:r>
+                <a:rPr lang="en-US" b="1" dirty="0"/>
+                <a:t>Image</a:t>
+              </a:r>
+            </a:p>
+          </p:txBody>
+        </p:sp>
+        <p:pic>
+          <p:nvPicPr>
+            <p:cNvPr id="1027" name="Picture 3">
+              <a:extLst>
+                <a:ext uri="{FF2B5EF4-FFF2-40B4-BE49-F238E27FC236}">
+                  <a16:creationId xmlns:a16="http://schemas.microsoft.com/office/drawing/2014/main" id="{C6D04DBC-F9D0-4152-B336-8D44FA0A0821}"/>
+                </a:ext>
+              </a:extLst>
+            </p:cNvPr>
+            <p:cNvPicPr>
+              <a:picLocks noChangeAspect="1" noChangeArrowheads="1"/>
+            </p:cNvPicPr>
+            <p:nvPr/>
+          </p:nvPicPr>
+          <p:blipFill>
+            <a:blip r:embed="rId4">
+              <a:extLst>
+                <a:ext uri="{28A0092B-C50C-407E-A947-70E740481C1C}">
+                  <a14:useLocalDpi xmlns:a14="http://schemas.microsoft.com/office/drawing/2010/main" val="0"/>
+                </a:ext>
+              </a:extLst>
+            </a:blip>
+            <a:srcRect/>
+            <a:stretch>
+              <a:fillRect/>
+            </a:stretch>
+          </p:blipFill>
+          <p:spPr bwMode="auto">
+            <a:xfrm>
+              <a:off x="7677151" y="359229"/>
+              <a:ext cx="2790825" cy="3390900"/>
+            </a:xfrm>
+            <a:prstGeom prst="rect">
+              <a:avLst/>
+            </a:prstGeom>
+            <a:noFill/>
+            <a:extLst>
+              <a:ext uri="{909E8E84-426E-40DD-AFC4-6F175D3DCCD1}">
+                <a14:hiddenFill xmlns:a14="http://schemas.microsoft.com/office/drawing/2010/main">
+                  <a:solidFill>
+                    <a:srgbClr val="FFFFFF"/>
+                  </a:solidFill>
+                </a14:hiddenFill>
+              </a:ext>
+            </a:extLst>
+          </p:spPr>
+        </p:pic>
+        <p:cxnSp>
+          <p:nvCxnSpPr>
+            <p:cNvPr id="4" name="Straight Arrow Connector 3">
+              <a:extLst>
+                <a:ext uri="{FF2B5EF4-FFF2-40B4-BE49-F238E27FC236}">
+                  <a16:creationId xmlns:a16="http://schemas.microsoft.com/office/drawing/2014/main" id="{508F73EC-BE9E-4F07-8D1A-BFEA695AD5EC}"/>
+                </a:ext>
+              </a:extLst>
+            </p:cNvPr>
+            <p:cNvCxnSpPr>
+              <a:cxnSpLocks/>
+              <a:endCxn id="1027" idx="1"/>
+            </p:cNvCxnSpPr>
+            <p:nvPr/>
+          </p:nvCxnSpPr>
+          <p:spPr>
+            <a:xfrm>
+              <a:off x="6048373" y="2054679"/>
+              <a:ext cx="1628778" cy="0"/>
+            </a:xfrm>
+            <a:prstGeom prst="straightConnector1">
+              <a:avLst/>
+            </a:prstGeom>
+            <a:ln w="76200">
+              <a:tailEnd type="triangle"/>
+            </a:ln>
+          </p:spPr>
+          <p:style>
+            <a:lnRef idx="1">
+              <a:schemeClr val="dk1"/>
+            </a:lnRef>
+            <a:fillRef idx="0">
+              <a:schemeClr val="dk1"/>
+            </a:fillRef>
+            <a:effectRef idx="0">
+              <a:schemeClr val="dk1"/>
+            </a:effectRef>
+            <a:fontRef idx="minor">
+              <a:schemeClr val="tx1"/>
+            </a:fontRef>
+          </p:style>
+        </p:cxnSp>
+        <p:sp>
+          <p:nvSpPr>
+            <p:cNvPr id="10" name="TextBox 9">
+              <a:extLst>
+                <a:ext uri="{FF2B5EF4-FFF2-40B4-BE49-F238E27FC236}">
+                  <a16:creationId xmlns:a16="http://schemas.microsoft.com/office/drawing/2014/main" id="{D82CC70E-D4E3-48D6-932D-B14FE8699B1A}"/>
+                </a:ext>
+              </a:extLst>
+            </p:cNvPr>
+            <p:cNvSpPr txBox="1"/>
+            <p:nvPr/>
+          </p:nvSpPr>
+          <p:spPr>
+            <a:xfrm>
+              <a:off x="5900739" y="1500681"/>
+              <a:ext cx="1986644" cy="1107996"/>
+            </a:xfrm>
+            <a:prstGeom prst="rect">
+              <a:avLst/>
+            </a:prstGeom>
+            <a:noFill/>
+          </p:spPr>
+          <p:txBody>
+            <a:bodyPr wrap="square" rtlCol="0">
+              <a:spAutoFit/>
+            </a:bodyPr>
+            <a:lstStyle/>
+            <a:p>
+              <a:r>
+                <a:rPr lang="en-US" sz="2200" b="1" dirty="0"/>
+                <a:t>Feature-based</a:t>
+              </a:r>
+            </a:p>
+            <a:p>
+              <a:endParaRPr lang="en-US" sz="2200" b="1" dirty="0"/>
+            </a:p>
+            <a:p>
+              <a:r>
+                <a:rPr lang="en-US" sz="2200" b="1" dirty="0"/>
+                <a:t>Transform</a:t>
+              </a:r>
+            </a:p>
+          </p:txBody>
+        </p:sp>
+        <p:cxnSp>
+          <p:nvCxnSpPr>
+            <p:cNvPr id="12" name="Straight Arrow Connector 11">
+              <a:extLst>
+                <a:ext uri="{FF2B5EF4-FFF2-40B4-BE49-F238E27FC236}">
+                  <a16:creationId xmlns:a16="http://schemas.microsoft.com/office/drawing/2014/main" id="{BAF10B98-B74B-4E1F-B416-E5D5DBBAA3F8}"/>
+                </a:ext>
+              </a:extLst>
+            </p:cNvPr>
+            <p:cNvCxnSpPr>
+              <a:cxnSpLocks/>
+            </p:cNvCxnSpPr>
+            <p:nvPr/>
+          </p:nvCxnSpPr>
+          <p:spPr>
+            <a:xfrm>
+              <a:off x="10821220" y="2054679"/>
+              <a:ext cx="1628778" cy="0"/>
+            </a:xfrm>
+            <a:prstGeom prst="straightConnector1">
+              <a:avLst/>
+            </a:prstGeom>
+            <a:ln w="76200">
+              <a:tailEnd type="triangle"/>
+            </a:ln>
+          </p:spPr>
+          <p:style>
+            <a:lnRef idx="1">
+              <a:schemeClr val="dk1"/>
+            </a:lnRef>
+            <a:fillRef idx="0">
+              <a:schemeClr val="dk1"/>
+            </a:fillRef>
+            <a:effectRef idx="0">
+              <a:schemeClr val="dk1"/>
+            </a:effectRef>
+            <a:fontRef idx="minor">
+              <a:schemeClr val="tx1"/>
+            </a:fontRef>
+          </p:style>
+        </p:cxnSp>
+        <p:sp>
+          <p:nvSpPr>
+            <p:cNvPr id="13" name="TextBox 12">
+              <a:extLst>
+                <a:ext uri="{FF2B5EF4-FFF2-40B4-BE49-F238E27FC236}">
+                  <a16:creationId xmlns:a16="http://schemas.microsoft.com/office/drawing/2014/main" id="{BBC18468-05C5-443B-AD3C-C0C72434CE9F}"/>
+                </a:ext>
+              </a:extLst>
+            </p:cNvPr>
+            <p:cNvSpPr txBox="1"/>
+            <p:nvPr/>
+          </p:nvSpPr>
+          <p:spPr>
+            <a:xfrm>
+              <a:off x="10673586" y="1500681"/>
+              <a:ext cx="1986644" cy="1107996"/>
+            </a:xfrm>
+            <a:prstGeom prst="rect">
+              <a:avLst/>
+            </a:prstGeom>
+            <a:noFill/>
+          </p:spPr>
+          <p:txBody>
+            <a:bodyPr wrap="square" rtlCol="0">
+              <a:spAutoFit/>
+            </a:bodyPr>
+            <a:lstStyle/>
+            <a:p>
+              <a:r>
+                <a:rPr lang="en-US" sz="2200" b="1" dirty="0"/>
+                <a:t>Automatic</a:t>
+              </a:r>
+            </a:p>
+            <a:p>
+              <a:endParaRPr lang="en-US" sz="2200" b="1" dirty="0"/>
+            </a:p>
+            <a:p>
+              <a:r>
+                <a:rPr lang="en-US" sz="2200" b="1" dirty="0"/>
+                <a:t>Cropping</a:t>
+              </a:r>
+            </a:p>
+          </p:txBody>
+        </p:sp>
+        <p:pic>
+          <p:nvPicPr>
+            <p:cNvPr id="1028" name="Picture 4">
+              <a:extLst>
+                <a:ext uri="{FF2B5EF4-FFF2-40B4-BE49-F238E27FC236}">
+                  <a16:creationId xmlns:a16="http://schemas.microsoft.com/office/drawing/2014/main" id="{505F443B-2117-43A8-8803-DA621AACC19B}"/>
+                </a:ext>
+              </a:extLst>
+            </p:cNvPr>
+            <p:cNvPicPr>
+              <a:picLocks noChangeAspect="1" noChangeArrowheads="1"/>
+            </p:cNvPicPr>
+            <p:nvPr/>
+          </p:nvPicPr>
+          <p:blipFill>
+            <a:blip r:embed="rId5">
+              <a:extLst>
+                <a:ext uri="{28A0092B-C50C-407E-A947-70E740481C1C}">
+                  <a14:useLocalDpi xmlns:a14="http://schemas.microsoft.com/office/drawing/2010/main" val="0"/>
+                </a:ext>
+              </a:extLst>
+            </a:blip>
+            <a:srcRect/>
+            <a:stretch>
+              <a:fillRect/>
+            </a:stretch>
+          </p:blipFill>
+          <p:spPr bwMode="auto">
+            <a:xfrm>
+              <a:off x="12449998" y="391328"/>
+              <a:ext cx="2505075" cy="3390900"/>
+            </a:xfrm>
+            <a:prstGeom prst="rect">
+              <a:avLst/>
+            </a:prstGeom>
+            <a:noFill/>
+            <a:extLst>
+              <a:ext uri="{909E8E84-426E-40DD-AFC4-6F175D3DCCD1}">
+                <a14:hiddenFill xmlns:a14="http://schemas.microsoft.com/office/drawing/2010/main">
+                  <a:solidFill>
+                    <a:srgbClr val="FFFFFF"/>
+                  </a:solidFill>
+                </a14:hiddenFill>
+              </a:ext>
+            </a:extLst>
+          </p:spPr>
+        </p:pic>
+        <p:sp>
+          <p:nvSpPr>
+            <p:cNvPr id="15" name="TextBox 14">
+              <a:extLst>
+                <a:ext uri="{FF2B5EF4-FFF2-40B4-BE49-F238E27FC236}">
+                  <a16:creationId xmlns:a16="http://schemas.microsoft.com/office/drawing/2014/main" id="{66F97DF0-220B-4D74-9BDD-196E076980B6}"/>
+                </a:ext>
+              </a:extLst>
+            </p:cNvPr>
+            <p:cNvSpPr txBox="1"/>
+            <p:nvPr/>
+          </p:nvSpPr>
+          <p:spPr>
+            <a:xfrm>
+              <a:off x="13224139" y="3750129"/>
+              <a:ext cx="1551214" cy="369332"/>
+            </a:xfrm>
+            <a:prstGeom prst="rect">
+              <a:avLst/>
+            </a:prstGeom>
+            <a:noFill/>
+          </p:spPr>
+          <p:txBody>
+            <a:bodyPr wrap="square" rtlCol="0">
+              <a:spAutoFit/>
+            </a:bodyPr>
+            <a:lstStyle/>
+            <a:p>
+              <a:r>
+                <a:rPr lang="en-US" b="1" dirty="0"/>
+                <a:t>Reference</a:t>
+              </a:r>
+            </a:p>
+          </p:txBody>
+        </p:sp>
+        <p:pic>
+          <p:nvPicPr>
+            <p:cNvPr id="1029" name="Picture 5">
+              <a:extLst>
+                <a:ext uri="{FF2B5EF4-FFF2-40B4-BE49-F238E27FC236}">
+                  <a16:creationId xmlns:a16="http://schemas.microsoft.com/office/drawing/2014/main" id="{A6329678-BD9E-493D-8828-005528F8657B}"/>
+                </a:ext>
+              </a:extLst>
+            </p:cNvPr>
+            <p:cNvPicPr>
+              <a:picLocks noChangeAspect="1" noChangeArrowheads="1"/>
+            </p:cNvPicPr>
+            <p:nvPr/>
+          </p:nvPicPr>
+          <p:blipFill>
+            <a:blip r:embed="rId6">
+              <a:extLst>
+                <a:ext uri="{28A0092B-C50C-407E-A947-70E740481C1C}">
+                  <a14:useLocalDpi xmlns:a14="http://schemas.microsoft.com/office/drawing/2010/main" val="0"/>
+                </a:ext>
+              </a:extLst>
+            </a:blip>
+            <a:srcRect/>
+            <a:stretch>
+              <a:fillRect/>
+            </a:stretch>
+          </p:blipFill>
+          <p:spPr bwMode="auto">
+            <a:xfrm>
+              <a:off x="14963694" y="359229"/>
+              <a:ext cx="2505075" cy="3390900"/>
+            </a:xfrm>
+            <a:prstGeom prst="rect">
+              <a:avLst/>
+            </a:prstGeom>
+            <a:noFill/>
+            <a:extLst>
+              <a:ext uri="{909E8E84-426E-40DD-AFC4-6F175D3DCCD1}">
+                <a14:hiddenFill xmlns:a14="http://schemas.microsoft.com/office/drawing/2010/main">
+                  <a:solidFill>
+                    <a:srgbClr val="FFFFFF"/>
+                  </a:solidFill>
+                </a14:hiddenFill>
+              </a:ext>
+            </a:extLst>
+          </p:spPr>
+        </p:pic>
+        <p:sp>
+          <p:nvSpPr>
+            <p:cNvPr id="17" name="TextBox 16">
+              <a:extLst>
+                <a:ext uri="{FF2B5EF4-FFF2-40B4-BE49-F238E27FC236}">
+                  <a16:creationId xmlns:a16="http://schemas.microsoft.com/office/drawing/2014/main" id="{9B5D37B3-31D4-4C02-9267-8DCD9E23AEED}"/>
+                </a:ext>
+              </a:extLst>
+            </p:cNvPr>
+            <p:cNvSpPr txBox="1"/>
+            <p:nvPr/>
+          </p:nvSpPr>
+          <p:spPr>
+            <a:xfrm>
+              <a:off x="15917555" y="3750129"/>
+              <a:ext cx="1551214" cy="369332"/>
+            </a:xfrm>
+            <a:prstGeom prst="rect">
+              <a:avLst/>
+            </a:prstGeom>
+            <a:noFill/>
+          </p:spPr>
+          <p:txBody>
+            <a:bodyPr wrap="square" rtlCol="0">
+              <a:spAutoFit/>
+            </a:bodyPr>
+            <a:lstStyle/>
+            <a:p>
+              <a:r>
+                <a:rPr lang="en-US" b="1" dirty="0"/>
+                <a:t>Image</a:t>
+              </a:r>
+            </a:p>
+          </p:txBody>
+        </p:sp>
+        <p:sp>
+          <p:nvSpPr>
+            <p:cNvPr id="18" name="TextBox 17">
+              <a:extLst>
+                <a:ext uri="{FF2B5EF4-FFF2-40B4-BE49-F238E27FC236}">
+                  <a16:creationId xmlns:a16="http://schemas.microsoft.com/office/drawing/2014/main" id="{3F9D678C-B8FD-4962-8816-E9605C3E2C55}"/>
+                </a:ext>
+              </a:extLst>
+            </p:cNvPr>
+            <p:cNvSpPr txBox="1"/>
+            <p:nvPr/>
+          </p:nvSpPr>
+          <p:spPr>
+            <a:xfrm>
+              <a:off x="-149000" y="43544"/>
+              <a:ext cx="1551214" cy="707886"/>
+            </a:xfrm>
+            <a:prstGeom prst="rect">
+              <a:avLst/>
+            </a:prstGeom>
+            <a:noFill/>
+          </p:spPr>
+          <p:txBody>
+            <a:bodyPr wrap="square" rtlCol="0">
+              <a:spAutoFit/>
+            </a:bodyPr>
+            <a:lstStyle/>
+            <a:p>
+              <a:r>
+                <a:rPr lang="en-US" sz="4000" b="1" dirty="0"/>
+                <a:t>a</a:t>
+              </a:r>
+            </a:p>
+          </p:txBody>
+        </p:sp>
+        <p:sp>
+          <p:nvSpPr>
+            <p:cNvPr id="19" name="TextBox 18">
+              <a:extLst>
+                <a:ext uri="{FF2B5EF4-FFF2-40B4-BE49-F238E27FC236}">
+                  <a16:creationId xmlns:a16="http://schemas.microsoft.com/office/drawing/2014/main" id="{A388D1B4-B609-4047-88E2-929312766CB6}"/>
+                </a:ext>
+              </a:extLst>
+            </p:cNvPr>
+            <p:cNvSpPr txBox="1"/>
+            <p:nvPr/>
+          </p:nvSpPr>
+          <p:spPr>
+            <a:xfrm>
+              <a:off x="-141745" y="3994952"/>
+              <a:ext cx="1551214" cy="707886"/>
+            </a:xfrm>
+            <a:prstGeom prst="rect">
+              <a:avLst/>
+            </a:prstGeom>
+            <a:noFill/>
+          </p:spPr>
+          <p:txBody>
+            <a:bodyPr wrap="square" rtlCol="0">
+              <a:spAutoFit/>
+            </a:bodyPr>
+            <a:lstStyle/>
+            <a:p>
+              <a:r>
+                <a:rPr lang="en-US" sz="4000" b="1" dirty="0"/>
+                <a:t>b</a:t>
+              </a:r>
+            </a:p>
+          </p:txBody>
+        </p:sp>
+        <p:sp>
+          <p:nvSpPr>
+            <p:cNvPr id="20" name="TextBox 19">
+              <a:extLst>
+                <a:ext uri="{FF2B5EF4-FFF2-40B4-BE49-F238E27FC236}">
+                  <a16:creationId xmlns:a16="http://schemas.microsoft.com/office/drawing/2014/main" id="{B9408FC8-67E3-470C-B6C6-FBAF2A55D575}"/>
+                </a:ext>
+              </a:extLst>
+            </p:cNvPr>
+            <p:cNvSpPr txBox="1"/>
+            <p:nvPr/>
+          </p:nvSpPr>
+          <p:spPr>
+            <a:xfrm>
+              <a:off x="7916085" y="4032070"/>
+              <a:ext cx="1551214" cy="707886"/>
+            </a:xfrm>
+            <a:prstGeom prst="rect">
+              <a:avLst/>
+            </a:prstGeom>
+            <a:noFill/>
+          </p:spPr>
+          <p:txBody>
+            <a:bodyPr wrap="square" rtlCol="0">
+              <a:spAutoFit/>
+            </a:bodyPr>
+            <a:lstStyle/>
+            <a:p>
+              <a:r>
+                <a:rPr lang="en-US" sz="4000" b="1" dirty="0"/>
+                <a:t>c</a:t>
+              </a:r>
+            </a:p>
+          </p:txBody>
+        </p:sp>
+        <p:pic>
+          <p:nvPicPr>
+            <p:cNvPr id="8" name="Picture 7">
+              <a:extLst>
+                <a:ext uri="{FF2B5EF4-FFF2-40B4-BE49-F238E27FC236}">
+                  <a16:creationId xmlns:a16="http://schemas.microsoft.com/office/drawing/2014/main" id="{48B76FCE-824D-457B-9CC9-9956CCADE8EE}"/>
+                </a:ext>
+              </a:extLst>
+            </p:cNvPr>
+            <p:cNvPicPr>
+              <a:picLocks noChangeAspect="1"/>
+            </p:cNvPicPr>
+            <p:nvPr/>
+          </p:nvPicPr>
+          <p:blipFill>
+            <a:blip r:embed="rId7">
+              <a:extLst>
+                <a:ext uri="{28A0092B-C50C-407E-A947-70E740481C1C}">
+                  <a14:useLocalDpi xmlns:a14="http://schemas.microsoft.com/office/drawing/2010/main" val="0"/>
+                </a:ext>
+              </a:extLst>
+            </a:blip>
+            <a:stretch>
+              <a:fillRect/>
+            </a:stretch>
+          </p:blipFill>
+          <p:spPr>
+            <a:xfrm>
+              <a:off x="684440" y="4310637"/>
+              <a:ext cx="6504890" cy="3613828"/>
+            </a:xfrm>
+            <a:prstGeom prst="rect">
+              <a:avLst/>
+            </a:prstGeom>
+          </p:spPr>
+        </p:pic>
+        <p:pic>
+          <p:nvPicPr>
+            <p:cNvPr id="1030" name="Picture 6">
+              <a:extLst>
+                <a:ext uri="{FF2B5EF4-FFF2-40B4-BE49-F238E27FC236}">
+                  <a16:creationId xmlns:a16="http://schemas.microsoft.com/office/drawing/2014/main" id="{895229D8-432D-41E2-A148-F8073DE4DBD6}"/>
+                </a:ext>
+              </a:extLst>
+            </p:cNvPr>
+            <p:cNvPicPr>
+              <a:picLocks noChangeAspect="1" noChangeArrowheads="1"/>
+            </p:cNvPicPr>
+            <p:nvPr/>
+          </p:nvPicPr>
+          <p:blipFill>
+            <a:blip r:embed="rId8">
+              <a:extLst>
+                <a:ext uri="{28A0092B-C50C-407E-A947-70E740481C1C}">
+                  <a14:useLocalDpi xmlns:a14="http://schemas.microsoft.com/office/drawing/2010/main" val="0"/>
+                </a:ext>
+              </a:extLst>
+            </a:blip>
+            <a:srcRect/>
+            <a:stretch>
+              <a:fillRect/>
+            </a:stretch>
+          </p:blipFill>
+          <p:spPr bwMode="auto">
+            <a:xfrm>
+              <a:off x="8341935" y="4248853"/>
+              <a:ext cx="2331651" cy="2500714"/>
+            </a:xfrm>
+            <a:prstGeom prst="rect">
+              <a:avLst/>
+            </a:prstGeom>
+            <a:noFill/>
+            <a:extLst>
+              <a:ext uri="{909E8E84-426E-40DD-AFC4-6F175D3DCCD1}">
+                <a14:hiddenFill xmlns:a14="http://schemas.microsoft.com/office/drawing/2010/main">
+                  <a:solidFill>
+                    <a:srgbClr val="FFFFFF"/>
+                  </a:solidFill>
+                </a14:hiddenFill>
+              </a:ext>
+            </a:extLst>
+          </p:spPr>
+        </p:pic>
+        <p:sp>
+          <p:nvSpPr>
+            <p:cNvPr id="24" name="TextBox 23">
+              <a:extLst>
+                <a:ext uri="{FF2B5EF4-FFF2-40B4-BE49-F238E27FC236}">
+                  <a16:creationId xmlns:a16="http://schemas.microsoft.com/office/drawing/2014/main" id="{5BAACA93-BF8F-43C3-BB11-E5A1A5B7CB63}"/>
+                </a:ext>
+              </a:extLst>
+            </p:cNvPr>
+            <p:cNvSpPr txBox="1"/>
+            <p:nvPr/>
+          </p:nvSpPr>
+          <p:spPr>
+            <a:xfrm>
+              <a:off x="9040037" y="6655378"/>
+              <a:ext cx="1551214" cy="369332"/>
+            </a:xfrm>
+            <a:prstGeom prst="rect">
+              <a:avLst/>
+            </a:prstGeom>
+            <a:noFill/>
+          </p:spPr>
+          <p:txBody>
+            <a:bodyPr wrap="square" rtlCol="0">
+              <a:spAutoFit/>
+            </a:bodyPr>
+            <a:lstStyle/>
+            <a:p>
+              <a:r>
+                <a:rPr lang="en-US" b="1" dirty="0"/>
+                <a:t>Reference</a:t>
+              </a:r>
+            </a:p>
+          </p:txBody>
+        </p:sp>
+        <p:pic>
+          <p:nvPicPr>
+            <p:cNvPr id="1031" name="Picture 7">
+              <a:extLst>
+                <a:ext uri="{FF2B5EF4-FFF2-40B4-BE49-F238E27FC236}">
+                  <a16:creationId xmlns:a16="http://schemas.microsoft.com/office/drawing/2014/main" id="{6C36C461-8740-47BE-8FF7-F110B5632416}"/>
+                </a:ext>
+              </a:extLst>
+            </p:cNvPr>
+            <p:cNvPicPr>
+              <a:picLocks noChangeAspect="1" noChangeArrowheads="1"/>
+            </p:cNvPicPr>
+            <p:nvPr/>
+          </p:nvPicPr>
+          <p:blipFill>
+            <a:blip r:embed="rId9">
+              <a:extLst>
+                <a:ext uri="{28A0092B-C50C-407E-A947-70E740481C1C}">
+                  <a14:useLocalDpi xmlns:a14="http://schemas.microsoft.com/office/drawing/2010/main" val="0"/>
+                </a:ext>
+              </a:extLst>
+            </a:blip>
+            <a:srcRect/>
+            <a:stretch>
+              <a:fillRect/>
+            </a:stretch>
+          </p:blipFill>
+          <p:spPr bwMode="auto">
+            <a:xfrm>
+              <a:off x="10938978" y="4229395"/>
+              <a:ext cx="2331652" cy="2500715"/>
+            </a:xfrm>
+            <a:prstGeom prst="rect">
+              <a:avLst/>
+            </a:prstGeom>
+            <a:noFill/>
+            <a:extLst>
+              <a:ext uri="{909E8E84-426E-40DD-AFC4-6F175D3DCCD1}">
+                <a14:hiddenFill xmlns:a14="http://schemas.microsoft.com/office/drawing/2010/main">
+                  <a:solidFill>
+                    <a:srgbClr val="FFFFFF"/>
+                  </a:solidFill>
+                </a14:hiddenFill>
+              </a:ext>
+            </a:extLst>
+          </p:spPr>
+        </p:pic>
+        <p:sp>
+          <p:nvSpPr>
+            <p:cNvPr id="26" name="TextBox 25">
+              <a:extLst>
+                <a:ext uri="{FF2B5EF4-FFF2-40B4-BE49-F238E27FC236}">
+                  <a16:creationId xmlns:a16="http://schemas.microsoft.com/office/drawing/2014/main" id="{9FFE0BB6-CD91-4252-86FE-3102D66C39E1}"/>
+                </a:ext>
+              </a:extLst>
+            </p:cNvPr>
+            <p:cNvSpPr txBox="1"/>
+            <p:nvPr/>
+          </p:nvSpPr>
+          <p:spPr>
+            <a:xfrm>
+              <a:off x="11754865" y="6655378"/>
+              <a:ext cx="1551214" cy="369332"/>
+            </a:xfrm>
+            <a:prstGeom prst="rect">
+              <a:avLst/>
+            </a:prstGeom>
+            <a:noFill/>
+          </p:spPr>
+          <p:txBody>
+            <a:bodyPr wrap="square" rtlCol="0">
+              <a:spAutoFit/>
+            </a:bodyPr>
+            <a:lstStyle/>
+            <a:p>
+              <a:r>
+                <a:rPr lang="en-US" b="1" dirty="0"/>
+                <a:t>Shifted</a:t>
+              </a:r>
+            </a:p>
+          </p:txBody>
+        </p:sp>
+        <p:cxnSp>
+          <p:nvCxnSpPr>
+            <p:cNvPr id="27" name="Straight Arrow Connector 26">
+              <a:extLst>
+                <a:ext uri="{FF2B5EF4-FFF2-40B4-BE49-F238E27FC236}">
+                  <a16:creationId xmlns:a16="http://schemas.microsoft.com/office/drawing/2014/main" id="{6695271A-6008-4BA4-9031-EB3E8126A459}"/>
+                </a:ext>
+              </a:extLst>
+            </p:cNvPr>
+            <p:cNvCxnSpPr>
+              <a:cxnSpLocks/>
+            </p:cNvCxnSpPr>
+            <p:nvPr/>
+          </p:nvCxnSpPr>
+          <p:spPr>
+            <a:xfrm>
+              <a:off x="13371773" y="5360648"/>
+              <a:ext cx="1628778" cy="0"/>
+            </a:xfrm>
+            <a:prstGeom prst="straightConnector1">
+              <a:avLst/>
+            </a:prstGeom>
+            <a:ln w="76200">
+              <a:tailEnd type="triangle"/>
+            </a:ln>
+          </p:spPr>
+          <p:style>
+            <a:lnRef idx="1">
+              <a:schemeClr val="dk1"/>
+            </a:lnRef>
+            <a:fillRef idx="0">
+              <a:schemeClr val="dk1"/>
+            </a:fillRef>
+            <a:effectRef idx="0">
+              <a:schemeClr val="dk1"/>
+            </a:effectRef>
+            <a:fontRef idx="minor">
+              <a:schemeClr val="tx1"/>
+            </a:fontRef>
+          </p:style>
+        </p:cxnSp>
+        <p:sp>
+          <p:nvSpPr>
+            <p:cNvPr id="28" name="TextBox 27">
+              <a:extLst>
+                <a:ext uri="{FF2B5EF4-FFF2-40B4-BE49-F238E27FC236}">
+                  <a16:creationId xmlns:a16="http://schemas.microsoft.com/office/drawing/2014/main" id="{1F96B08A-B07B-43D1-81CE-11B1BFE492A3}"/>
+                </a:ext>
+              </a:extLst>
+            </p:cNvPr>
+            <p:cNvSpPr txBox="1"/>
+            <p:nvPr/>
+          </p:nvSpPr>
+          <p:spPr>
+            <a:xfrm>
+              <a:off x="13224139" y="4806650"/>
+              <a:ext cx="1986644" cy="1107996"/>
+            </a:xfrm>
+            <a:prstGeom prst="rect">
+              <a:avLst/>
+            </a:prstGeom>
+            <a:noFill/>
+          </p:spPr>
+          <p:txBody>
+            <a:bodyPr wrap="square" rtlCol="0">
+              <a:spAutoFit/>
+            </a:bodyPr>
+            <a:lstStyle/>
+            <a:p>
+              <a:r>
+                <a:rPr lang="en-US" sz="2200" b="1" dirty="0"/>
+                <a:t>Feature-based</a:t>
+              </a:r>
+            </a:p>
+            <a:p>
+              <a:endParaRPr lang="en-US" sz="2200" b="1" dirty="0"/>
+            </a:p>
+            <a:p>
+              <a:r>
+                <a:rPr lang="en-US" sz="2200" b="1" dirty="0"/>
+                <a:t>Transform</a:t>
+              </a:r>
+            </a:p>
+          </p:txBody>
+        </p:sp>
+        <p:pic>
+          <p:nvPicPr>
+            <p:cNvPr id="1032" name="Picture 8">
+              <a:extLst>
+                <a:ext uri="{FF2B5EF4-FFF2-40B4-BE49-F238E27FC236}">
+                  <a16:creationId xmlns:a16="http://schemas.microsoft.com/office/drawing/2014/main" id="{17BA29DC-3099-4B40-AB16-7A8BC7CB8F17}"/>
+                </a:ext>
+              </a:extLst>
+            </p:cNvPr>
+            <p:cNvPicPr>
+              <a:picLocks noChangeAspect="1" noChangeArrowheads="1"/>
+            </p:cNvPicPr>
+            <p:nvPr/>
+          </p:nvPicPr>
+          <p:blipFill>
+            <a:blip r:embed="rId10">
+              <a:extLst>
+                <a:ext uri="{28A0092B-C50C-407E-A947-70E740481C1C}">
+                  <a14:useLocalDpi xmlns:a14="http://schemas.microsoft.com/office/drawing/2010/main" val="0"/>
+                </a:ext>
+              </a:extLst>
+            </a:blip>
+            <a:srcRect/>
+            <a:stretch>
+              <a:fillRect/>
+            </a:stretch>
+          </p:blipFill>
+          <p:spPr bwMode="auto">
+            <a:xfrm>
+              <a:off x="15031777" y="4229395"/>
+              <a:ext cx="2367936" cy="2539630"/>
+            </a:xfrm>
+            <a:prstGeom prst="rect">
+              <a:avLst/>
+            </a:prstGeom>
+            <a:noFill/>
+            <a:extLst>
+              <a:ext uri="{909E8E84-426E-40DD-AFC4-6F175D3DCCD1}">
+                <a14:hiddenFill xmlns:a14="http://schemas.microsoft.com/office/drawing/2010/main">
+                  <a:solidFill>
+                    <a:srgbClr val="FFFFFF"/>
+                  </a:solidFill>
+                </a14:hiddenFill>
+              </a:ext>
+            </a:extLst>
+          </p:spPr>
+        </p:pic>
+        <p:sp>
+          <p:nvSpPr>
+            <p:cNvPr id="30" name="TextBox 29">
+              <a:extLst>
+                <a:ext uri="{FF2B5EF4-FFF2-40B4-BE49-F238E27FC236}">
+                  <a16:creationId xmlns:a16="http://schemas.microsoft.com/office/drawing/2014/main" id="{72A787FF-EAFE-4479-9414-FB73F3E61457}"/>
+                </a:ext>
+              </a:extLst>
+            </p:cNvPr>
+            <p:cNvSpPr txBox="1"/>
+            <p:nvPr/>
+          </p:nvSpPr>
+          <p:spPr>
+            <a:xfrm>
+              <a:off x="8015515" y="6966350"/>
+              <a:ext cx="1551214" cy="707886"/>
+            </a:xfrm>
+            <a:prstGeom prst="rect">
+              <a:avLst/>
+            </a:prstGeom>
+            <a:noFill/>
+          </p:spPr>
+          <p:txBody>
+            <a:bodyPr wrap="square" rtlCol="0">
+              <a:spAutoFit/>
+            </a:bodyPr>
+            <a:lstStyle/>
+            <a:p>
+              <a:r>
+                <a:rPr lang="en-US" sz="4000" b="1" dirty="0"/>
+                <a:t>d</a:t>
+              </a:r>
+            </a:p>
+          </p:txBody>
+        </p:sp>
+        <p:pic>
+          <p:nvPicPr>
+            <p:cNvPr id="1033" name="Picture 9">
+              <a:extLst>
+                <a:ext uri="{FF2B5EF4-FFF2-40B4-BE49-F238E27FC236}">
+                  <a16:creationId xmlns:a16="http://schemas.microsoft.com/office/drawing/2014/main" id="{19B24258-C5D5-4D9F-BD80-5786CB1280B8}"/>
+                </a:ext>
+              </a:extLst>
+            </p:cNvPr>
+            <p:cNvPicPr>
+              <a:picLocks noChangeAspect="1" noChangeArrowheads="1"/>
+            </p:cNvPicPr>
+            <p:nvPr/>
+          </p:nvPicPr>
+          <p:blipFill>
+            <a:blip r:embed="rId11">
+              <a:extLst>
+                <a:ext uri="{28A0092B-C50C-407E-A947-70E740481C1C}">
+                  <a14:useLocalDpi xmlns:a14="http://schemas.microsoft.com/office/drawing/2010/main" val="0"/>
+                </a:ext>
+              </a:extLst>
+            </a:blip>
+            <a:srcRect/>
+            <a:stretch>
+              <a:fillRect/>
+            </a:stretch>
+          </p:blipFill>
+          <p:spPr bwMode="auto">
+            <a:xfrm>
+              <a:off x="14188716" y="6878959"/>
+              <a:ext cx="2331652" cy="2500714"/>
+            </a:xfrm>
+            <a:prstGeom prst="rect">
+              <a:avLst/>
+            </a:prstGeom>
+            <a:noFill/>
+            <a:extLst>
+              <a:ext uri="{909E8E84-426E-40DD-AFC4-6F175D3DCCD1}">
+                <a14:hiddenFill xmlns:a14="http://schemas.microsoft.com/office/drawing/2010/main">
+                  <a:solidFill>
+                    <a:srgbClr val="FFFFFF"/>
+                  </a:solidFill>
+                </a14:hiddenFill>
+              </a:ext>
+            </a:extLst>
+          </p:spPr>
+        </p:pic>
+        <p:pic>
+          <p:nvPicPr>
+            <p:cNvPr id="32" name="Picture 6">
+              <a:extLst>
+                <a:ext uri="{FF2B5EF4-FFF2-40B4-BE49-F238E27FC236}">
+                  <a16:creationId xmlns:a16="http://schemas.microsoft.com/office/drawing/2014/main" id="{2B1CA0F1-8CCE-42A4-9374-BACC12EF2061}"/>
+                </a:ext>
+              </a:extLst>
+            </p:cNvPr>
+            <p:cNvPicPr>
+              <a:picLocks noChangeAspect="1" noChangeArrowheads="1"/>
+            </p:cNvPicPr>
+            <p:nvPr/>
+          </p:nvPicPr>
+          <p:blipFill>
+            <a:blip r:embed="rId8">
+              <a:extLst>
+                <a:ext uri="{28A0092B-C50C-407E-A947-70E740481C1C}">
+                  <a14:useLocalDpi xmlns:a14="http://schemas.microsoft.com/office/drawing/2010/main" val="0"/>
+                </a:ext>
+              </a:extLst>
+            </a:blip>
+            <a:srcRect/>
+            <a:stretch>
+              <a:fillRect/>
+            </a:stretch>
+          </p:blipFill>
+          <p:spPr bwMode="auto">
+            <a:xfrm>
+              <a:off x="8339819" y="7024710"/>
+              <a:ext cx="2331651" cy="2500714"/>
+            </a:xfrm>
+            <a:prstGeom prst="rect">
+              <a:avLst/>
+            </a:prstGeom>
+            <a:noFill/>
+            <a:extLst>
+              <a:ext uri="{909E8E84-426E-40DD-AFC4-6F175D3DCCD1}">
+                <a14:hiddenFill xmlns:a14="http://schemas.microsoft.com/office/drawing/2010/main">
+                  <a:solidFill>
+                    <a:srgbClr val="FFFFFF"/>
+                  </a:solidFill>
+                </a14:hiddenFill>
+              </a:ext>
+            </a:extLst>
+          </p:spPr>
+        </p:pic>
+        <p:cxnSp>
+          <p:nvCxnSpPr>
+            <p:cNvPr id="33" name="Straight Arrow Connector 32">
+              <a:extLst>
+                <a:ext uri="{FF2B5EF4-FFF2-40B4-BE49-F238E27FC236}">
+                  <a16:creationId xmlns:a16="http://schemas.microsoft.com/office/drawing/2014/main" id="{5E0DE94B-9E23-465D-B51C-963EA599AA87}"/>
+                </a:ext>
+              </a:extLst>
+            </p:cNvPr>
+            <p:cNvCxnSpPr>
+              <a:cxnSpLocks/>
+            </p:cNvCxnSpPr>
+            <p:nvPr/>
+          </p:nvCxnSpPr>
+          <p:spPr>
+            <a:xfrm flipV="1">
+              <a:off x="10953345" y="8032260"/>
+              <a:ext cx="3046401" cy="2787"/>
+            </a:xfrm>
+            <a:prstGeom prst="straightConnector1">
+              <a:avLst/>
+            </a:prstGeom>
+            <a:ln w="76200">
+              <a:tailEnd type="triangle"/>
+            </a:ln>
+          </p:spPr>
+          <p:style>
+            <a:lnRef idx="1">
+              <a:schemeClr val="dk1"/>
+            </a:lnRef>
+            <a:fillRef idx="0">
+              <a:schemeClr val="dk1"/>
+            </a:fillRef>
+            <a:effectRef idx="0">
+              <a:schemeClr val="dk1"/>
+            </a:effectRef>
+            <a:fontRef idx="minor">
+              <a:schemeClr val="tx1"/>
+            </a:fontRef>
+          </p:style>
+        </p:cxnSp>
+        <p:sp>
+          <p:nvSpPr>
+            <p:cNvPr id="34" name="TextBox 33">
+              <a:extLst>
+                <a:ext uri="{FF2B5EF4-FFF2-40B4-BE49-F238E27FC236}">
+                  <a16:creationId xmlns:a16="http://schemas.microsoft.com/office/drawing/2014/main" id="{CC3E780B-ACED-4D54-966E-952423DA924D}"/>
+                </a:ext>
+              </a:extLst>
+            </p:cNvPr>
+            <p:cNvSpPr txBox="1"/>
+            <p:nvPr/>
+          </p:nvSpPr>
+          <p:spPr>
+            <a:xfrm>
+              <a:off x="11259084" y="7478262"/>
+              <a:ext cx="2331651" cy="1107996"/>
+            </a:xfrm>
+            <a:prstGeom prst="rect">
+              <a:avLst/>
+            </a:prstGeom>
+            <a:noFill/>
+          </p:spPr>
+          <p:txBody>
+            <a:bodyPr wrap="square" rtlCol="0">
+              <a:spAutoFit/>
+            </a:bodyPr>
+            <a:lstStyle/>
+            <a:p>
+              <a:r>
+                <a:rPr lang="en-US" sz="2200" b="1" dirty="0"/>
+                <a:t>White Background</a:t>
+              </a:r>
+            </a:p>
+            <a:p>
+              <a:endParaRPr lang="en-US" sz="2200" b="1" dirty="0"/>
+            </a:p>
+            <a:p>
+              <a:pPr algn="ctr"/>
+              <a:r>
+                <a:rPr lang="en-US" sz="2200" b="1" dirty="0"/>
+                <a:t>Masking</a:t>
+              </a:r>
+            </a:p>
+          </p:txBody>
+        </p:sp>
+        <p:sp>
+          <p:nvSpPr>
+            <p:cNvPr id="21" name="TextBox 20">
+              <a:extLst>
+                <a:ext uri="{FF2B5EF4-FFF2-40B4-BE49-F238E27FC236}">
+                  <a16:creationId xmlns:a16="http://schemas.microsoft.com/office/drawing/2014/main" id="{E72B3459-14A0-4734-9BD1-80458EAC8298}"/>
+                </a:ext>
+              </a:extLst>
+            </p:cNvPr>
+            <p:cNvSpPr txBox="1"/>
+            <p:nvPr/>
+          </p:nvSpPr>
+          <p:spPr>
+            <a:xfrm>
+              <a:off x="2436461" y="8275067"/>
+              <a:ext cx="4144735" cy="553998"/>
+            </a:xfrm>
+            <a:prstGeom prst="rect">
+              <a:avLst/>
+            </a:prstGeom>
+            <a:noFill/>
+          </p:spPr>
+          <p:txBody>
+            <a:bodyPr wrap="square" rtlCol="0">
+              <a:spAutoFit/>
+            </a:bodyPr>
+            <a:lstStyle/>
+            <a:p>
+              <a:r>
+                <a:rPr lang="en-US" sz="3000" b="1" dirty="0"/>
+                <a:t>Mapped Features</a:t>
+              </a:r>
+            </a:p>
+          </p:txBody>
+        </p:sp>
+      </p:grpSp>
+    </p:spTree>
+    <p:extLst>
+      <p:ext uri="{BB962C8B-B14F-4D97-AF65-F5344CB8AC3E}">
+        <p14:creationId xmlns:p14="http://schemas.microsoft.com/office/powerpoint/2010/main" val="3480970711"/>
+      </p:ext>
+    </p:extLst>
+  </p:cSld>
+  <p:clrMapOvr>
+    <a:masterClrMapping/>
+  </p:clrMapOvr>
+</p:sld>
+</file>
+
 <file path=ppt/theme/theme1.xml><?xml version="1.0" encoding="utf-8"?>
 <a:theme xmlns:a="http://schemas.openxmlformats.org/drawingml/2006/main" name="Office Theme">
   <a:themeElements>

</xml_diff>